<commit_message>
userlist optionality for multiple columns
</commit_message>
<xml_diff>
--- a/client/src/public/public2.pptx
+++ b/client/src/public/public2.pptx
@@ -3321,56 +3321,6 @@
           <a:chExt cx="0" cy="0"/>
         </a:xfrm>
       </p:grpSpPr>
-      <p:sp>
-        <p:nvSpPr>
-          <p:cNvPr id="2" name="Title 1">
-            <a:extLst>
-              <a:ext uri="{FF2B5EF4-FFF2-40B4-BE49-F238E27FC236}">
-                <a16:creationId xmlns:a16="http://schemas.microsoft.com/office/drawing/2014/main" id="{0052BD60-C65D-2049-BFAF-D5841123546D}"/>
-              </a:ext>
-            </a:extLst>
-          </p:cNvPr>
-          <p:cNvSpPr>
-            <a:spLocks noGrp="1"/>
-          </p:cNvSpPr>
-          <p:nvPr>
-            <p:ph type="ctrTitle"/>
-          </p:nvPr>
-        </p:nvSpPr>
-        <p:spPr/>
-        <p:txBody>
-          <a:bodyPr/>
-          <a:lstStyle/>
-          <a:p>
-            <a:endParaRPr lang="en-US"/>
-          </a:p>
-        </p:txBody>
-      </p:sp>
-      <p:sp>
-        <p:nvSpPr>
-          <p:cNvPr id="3" name="Subtitle 2">
-            <a:extLst>
-              <a:ext uri="{FF2B5EF4-FFF2-40B4-BE49-F238E27FC236}">
-                <a16:creationId xmlns:a16="http://schemas.microsoft.com/office/drawing/2014/main" id="{3BD79D8F-FE70-F44B-8932-D4AE565A0670}"/>
-              </a:ext>
-            </a:extLst>
-          </p:cNvPr>
-          <p:cNvSpPr>
-            <a:spLocks noGrp="1"/>
-          </p:cNvSpPr>
-          <p:nvPr>
-            <p:ph type="subTitle" idx="1"/>
-          </p:nvPr>
-        </p:nvSpPr>
-        <p:spPr/>
-        <p:txBody>
-          <a:bodyPr/>
-          <a:lstStyle/>
-          <a:p>
-            <a:endParaRPr lang="en-US"/>
-          </a:p>
-        </p:txBody>
-      </p:sp>
       <p:pic>
         <p:nvPicPr>
           <p:cNvPr id="4" name="Picture 3">
@@ -3405,7 +3355,9 @@
                         <a14:foregroundMark x1="40827" y1="35931" x2="41230" y2="33622"/>
                         <a14:foregroundMark x1="39617" y1="35209" x2="40726" y2="33622"/>
                         <a14:foregroundMark x1="51915" y1="39105" x2="51915" y2="39105"/>
-                        <a14:foregroundMark x1="54335" y1="31602" x2="55242" y2="48918"/>
+                        <a14:foregroundMark x1="55045" y1="45166" x2="55242" y2="48918"/>
+                        <a14:foregroundMark x1="54969" y1="43723" x2="55045" y2="45166"/>
+                        <a14:foregroundMark x1="54335" y1="31602" x2="54969" y2="43723"/>
                         <a14:foregroundMark x1="52095" y1="34088" x2="52520" y2="36797"/>
                         <a14:foregroundMark x1="86391" y1="44589" x2="86391" y2="31746"/>
                         <a14:foregroundMark x1="86391" y1="56999" x2="86391" y2="44589"/>
@@ -3421,11 +3373,28 @@
                         <a14:foregroundMark x1="38710" y1="32612" x2="38911" y2="33333"/>
                         <a14:foregroundMark x1="39012" y1="33622" x2="39012" y2="33622"/>
                         <a14:foregroundMark x1="38710" y1="32612" x2="39617" y2="32900"/>
-                        <a14:foregroundMark x1="52823" y1="39105" x2="52823" y2="51515"/>
-                        <a14:foregroundMark x1="56250" y1="34921" x2="56250" y2="50216"/>
+                        <a14:foregroundMark x1="52823" y1="46609" x2="52823" y2="51515"/>
+                        <a14:foregroundMark x1="52823" y1="45887" x2="52823" y2="46609"/>
+                        <a14:foregroundMark x1="52823" y1="44877" x2="52823" y2="45310"/>
+                        <a14:foregroundMark x1="52823" y1="43001" x2="52823" y2="44877"/>
+                        <a14:foregroundMark x1="52823" y1="42424" x2="52823" y2="43001"/>
+                        <a14:foregroundMark x1="52823" y1="41991" x2="52823" y2="42424"/>
+                        <a14:foregroundMark x1="52823" y1="41126" x2="52823" y2="41991"/>
+                        <a14:foregroundMark x1="52823" y1="39105" x2="52823" y2="41126"/>
+                        <a14:foregroundMark x1="56250" y1="45166" x2="56250" y2="50216"/>
+                        <a14:foregroundMark x1="56250" y1="43723" x2="56250" y2="45166"/>
+                        <a14:foregroundMark x1="56250" y1="43290" x2="56250" y2="43723"/>
+                        <a14:foregroundMark x1="56250" y1="42713" x2="56250" y2="43290"/>
+                        <a14:foregroundMark x1="56250" y1="41703" x2="56250" y2="42713"/>
+                        <a14:foregroundMark x1="56250" y1="34921" x2="56250" y2="41703"/>
                         <a14:foregroundMark x1="54839" y1="44012" x2="52319" y2="50794"/>
-                        <a14:foregroundMark x1="51714" y1="50072" x2="53024" y2="41991"/>
-                        <a14:foregroundMark x1="53024" y1="42136" x2="52621" y2="43723"/>
+                        <a14:foregroundMark x1="52954" y1="42424" x2="53024" y2="41991"/>
+                        <a14:foregroundMark x1="52860" y1="43001" x2="52954" y2="42424"/>
+                        <a14:foregroundMark x1="52556" y1="44877" x2="52860" y2="43001"/>
+                        <a14:foregroundMark x1="52486" y1="45310" x2="52556" y2="44877"/>
+                        <a14:foregroundMark x1="52275" y1="46609" x2="52392" y2="45887"/>
+                        <a14:foregroundMark x1="52804" y1="43001" x2="52621" y2="43723"/>
+                        <a14:foregroundMark x1="53024" y1="42136" x2="52804" y2="43001"/>
                         <a14:foregroundMark x1="69456" y1="86147" x2="69456" y2="86003"/>
                         <a14:foregroundMark x1="74496" y1="86003" x2="76310" y2="86147"/>
                         <a14:foregroundMark x1="20464" y1="84560" x2="22278" y2="86436"/>
@@ -3443,8 +3412,153 @@
                         <a14:foregroundMark x1="72480" y1="33333" x2="72480" y2="33333"/>
                         <a14:foregroundMark x1="72480" y1="33333" x2="72480" y2="33333"/>
                         <a14:foregroundMark x1="72480" y1="33333" x2="72480" y2="33333"/>
-                        <a14:backgroundMark x1="51008" y1="44012" x2="51108" y2="43226"/>
-                        <a14:backgroundMark x1="58972" y1="46609" x2="57965" y2="44687"/>
+                        <a14:foregroundMark x1="50907" y1="40981" x2="50907" y2="40981"/>
+                        <a14:foregroundMark x1="50000" y1="41991" x2="50000" y2="41991"/>
+                        <a14:foregroundMark x1="50000" y1="42280" x2="50000" y2="42280"/>
+                        <a14:foregroundMark x1="50202" y1="42713" x2="50202" y2="42713"/>
+                        <a14:foregroundMark x1="50605" y1="42280" x2="50605" y2="42280"/>
+                        <a14:foregroundMark x1="50907" y1="41414" x2="50907" y2="41414"/>
+                        <a14:foregroundMark x1="51109" y1="41703" x2="51109" y2="41703"/>
+                        <a14:foregroundMark x1="52722" y1="43579" x2="52722" y2="43579"/>
+                        <a14:foregroundMark x1="52016" y1="42713" x2="52016" y2="42713"/>
+                        <a14:foregroundMark x1="52016" y1="44012" x2="52016" y2="44012"/>
+                        <a14:foregroundMark x1="52016" y1="45166" x2="52016" y2="45166"/>
+                        <a14:foregroundMark x1="56552" y1="50361" x2="56552" y2="50361"/>
+                        <a14:foregroundMark x1="56956" y1="48773" x2="56956" y2="48773"/>
+                        <a14:foregroundMark x1="56956" y1="47908" x2="56956" y2="47908"/>
+                        <a14:foregroundMark x1="56754" y1="46609" x2="56754" y2="46609"/>
+                        <a14:foregroundMark x1="56552" y1="45166" x2="56552" y2="45166"/>
+                        <a14:foregroundMark x1="56956" y1="47186" x2="56956" y2="47186"/>
+                        <a14:foregroundMark x1="56956" y1="47908" x2="56956" y2="47908"/>
+                        <a14:foregroundMark x1="57056" y1="47908" x2="57056" y2="47908"/>
+                        <a14:foregroundMark x1="57460" y1="47908" x2="57460" y2="47908"/>
+                        <a14:foregroundMark x1="57661" y1="47908" x2="57661" y2="47908"/>
+                        <a14:foregroundMark x1="56552" y1="45887" x2="56552" y2="45887"/>
+                        <a14:foregroundMark x1="56552" y1="46176" x2="56552" y2="46176"/>
+                        <a14:foregroundMark x1="52469" y1="44877" x2="52621" y2="44156"/>
+                        <a14:foregroundMark x1="52378" y1="45310" x2="52469" y2="44877"/>
+                        <a14:foregroundMark x1="52104" y1="46609" x2="52256" y2="45887"/>
+                        <a14:foregroundMark x1="51010" y1="51804" x2="51276" y2="50542"/>
+                        <a14:foregroundMark x1="50931" y1="52181" x2="51010" y2="51804"/>
+                        <a14:foregroundMark x1="52621" y1="44156" x2="54234" y2="41991"/>
+                        <a14:foregroundMark x1="51786" y1="46609" x2="52026" y2="45887"/>
+                        <a14:foregroundMark x1="50490" y1="50505" x2="50622" y2="50108"/>
+                        <a14:foregroundMark x1="50106" y1="51659" x2="50490" y2="50505"/>
+                        <a14:foregroundMark x1="52666" y1="44877" x2="53125" y2="43723"/>
+                        <a14:foregroundMark x1="52494" y1="45310" x2="52666" y2="44877"/>
+                        <a14:foregroundMark x1="51978" y1="46609" x2="52265" y2="45887"/>
+                        <a14:foregroundMark x1="56754" y1="51659" x2="56552" y2="46898"/>
+                        <a14:foregroundMark x1="56552" y1="46465" x2="56552" y2="46465"/>
+                        <a14:foregroundMark x1="56552" y1="46465" x2="56552" y2="46465"/>
+                        <a14:foregroundMark x1="56754" y1="46898" x2="56754" y2="46898"/>
+                        <a14:foregroundMark x1="56754" y1="46898" x2="56754" y2="46898"/>
+                        <a14:foregroundMark x1="56754" y1="46898" x2="56754" y2="46898"/>
+                        <a14:foregroundMark x1="56754" y1="46898" x2="56754" y2="46898"/>
+                        <a14:foregroundMark x1="56754" y1="46898" x2="56754" y2="46898"/>
+                        <a14:foregroundMark x1="56754" y1="46898" x2="56754" y2="46898"/>
+                        <a14:foregroundMark x1="56754" y1="46609" x2="56754" y2="46609"/>
+                        <a14:foregroundMark x1="56754" y1="46609" x2="56754" y2="46609"/>
+                        <a14:foregroundMark x1="56956" y1="46609" x2="56956" y2="46609"/>
+                        <a14:foregroundMark x1="56552" y1="46898" x2="56552" y2="46898"/>
+                        <a14:foregroundMark x1="56552" y1="46898" x2="56552" y2="46898"/>
+                        <a14:foregroundMark x1="56552" y1="46609" x2="56552" y2="46609"/>
+                        <a14:foregroundMark x1="56552" y1="46609" x2="56552" y2="46609"/>
+                        <a14:foregroundMark x1="56552" y1="46176" x2="56552" y2="46176"/>
+                        <a14:foregroundMark x1="56552" y1="46176" x2="56552" y2="46176"/>
+                        <a14:foregroundMark x1="56754" y1="46176" x2="56754" y2="46176"/>
+                        <a14:foregroundMark x1="56754" y1="46176" x2="56754" y2="46176"/>
+                        <a14:foregroundMark x1="56754" y1="46176" x2="56754" y2="46176"/>
+                        <a14:foregroundMark x1="56754" y1="46176" x2="56754" y2="46176"/>
+                        <a14:foregroundMark x1="56754" y1="45887" x2="56754" y2="45887"/>
+                        <a14:foregroundMark x1="56754" y1="45887" x2="56754" y2="45887"/>
+                        <a14:foregroundMark x1="56956" y1="46465" x2="56956" y2="46465"/>
+                        <a14:foregroundMark x1="56956" y1="46465" x2="56956" y2="46465"/>
+                        <a14:foregroundMark x1="56956" y1="46465" x2="56956" y2="46465"/>
+                        <a14:foregroundMark x1="56956" y1="46465" x2="56956" y2="46465"/>
+                        <a14:foregroundMark x1="56956" y1="46465" x2="56956" y2="46465"/>
+                        <a14:foregroundMark x1="56956" y1="46465" x2="56956" y2="46465"/>
+                        <a14:foregroundMark x1="56956" y1="46609" x2="56956" y2="46609"/>
+                        <a14:foregroundMark x1="56956" y1="46609" x2="56956" y2="46609"/>
+                        <a14:foregroundMark x1="56956" y1="46609" x2="56956" y2="46609"/>
+                        <a14:foregroundMark x1="57056" y1="47186" x2="57056" y2="47186"/>
+                        <a14:foregroundMark x1="57056" y1="47186" x2="57056" y2="47186"/>
+                        <a14:foregroundMark x1="56351" y1="45887" x2="56351" y2="45887"/>
+                        <a14:foregroundMark x1="56351" y1="45887" x2="56351" y2="45887"/>
+                        <a14:foregroundMark x1="56351" y1="45887" x2="56351" y2="45887"/>
+                        <a14:foregroundMark x1="56351" y1="45599" x2="56351" y2="45599"/>
+                        <a14:foregroundMark x1="56351" y1="45599" x2="56351" y2="45599"/>
+                        <a14:foregroundMark x1="56351" y1="45599" x2="56351" y2="45599"/>
+                        <a14:foregroundMark x1="56351" y1="45599" x2="56351" y2="45599"/>
+                        <a14:foregroundMark x1="56351" y1="45599" x2="56351" y2="45599"/>
+                        <a14:foregroundMark x1="56351" y1="45310" x2="56351" y2="45310"/>
+                        <a14:foregroundMark x1="56351" y1="45310" x2="56351" y2="45310"/>
+                        <a14:foregroundMark x1="56351" y1="45310" x2="56351" y2="45310"/>
+                        <a14:foregroundMark x1="56351" y1="45310" x2="56351" y2="45310"/>
+                        <a14:foregroundMark x1="56351" y1="45310" x2="56351" y2="45310"/>
+                        <a14:foregroundMark x1="56351" y1="45310" x2="56351" y2="45310"/>
+                        <a14:foregroundMark x1="56351" y1="45310" x2="56351" y2="45310"/>
+                        <a14:foregroundMark x1="56351" y1="45310" x2="56351" y2="45310"/>
+                        <a14:foregroundMark x1="56351" y1="44877" x2="56351" y2="44877"/>
+                        <a14:foregroundMark x1="56351" y1="45166" x2="56351" y2="45166"/>
+                        <a14:foregroundMark x1="56351" y1="45166" x2="56351" y2="45166"/>
+                        <a14:foregroundMark x1="56351" y1="45166" x2="56351" y2="45166"/>
+                        <a14:foregroundMark x1="56351" y1="45166" x2="56351" y2="45166"/>
+                        <a14:foregroundMark x1="56351" y1="45166" x2="56351" y2="45166"/>
+                        <a14:foregroundMark x1="56552" y1="45166" x2="56552" y2="45166"/>
+                        <a14:foregroundMark x1="56552" y1="45166" x2="56552" y2="45166"/>
+                        <a14:foregroundMark x1="56552" y1="45166" x2="56552" y2="45166"/>
+                        <a14:foregroundMark x1="56754" y1="45166" x2="56754" y2="45166"/>
+                        <a14:foregroundMark x1="56754" y1="45166" x2="56754" y2="45166"/>
+                        <a14:foregroundMark x1="56754" y1="45166" x2="56754" y2="45166"/>
+                        <a14:foregroundMark x1="56754" y1="45166" x2="56754" y2="45166"/>
+                        <a14:foregroundMark x1="56754" y1="45166" x2="56754" y2="45166"/>
+                        <a14:foregroundMark x1="56754" y1="45166" x2="56754" y2="45166"/>
+                        <a14:foregroundMark x1="56754" y1="45599" x2="56754" y2="45599"/>
+                        <a14:foregroundMark x1="56754" y1="46176" x2="56754" y2="46176"/>
+                        <a14:foregroundMark x1="56754" y1="46176" x2="56754" y2="46176"/>
+                        <a14:foregroundMark x1="51310" y1="44877" x2="51310" y2="44877"/>
+                        <a14:foregroundMark x1="56149" y1="47763" x2="56149" y2="47763"/>
+                        <a14:foregroundMark x1="56351" y1="47908" x2="56351" y2="47908"/>
+                        <a14:foregroundMark x1="56552" y1="47475" x2="56552" y2="47475"/>
+                        <a14:foregroundMark x1="56552" y1="47475" x2="56552" y2="47475"/>
+                        <a14:foregroundMark x1="56552" y1="47186" x2="56552" y2="47186"/>
+                        <a14:foregroundMark x1="56149" y1="46609" x2="56149" y2="46609"/>
+                        <a14:foregroundMark x1="56149" y1="46176" x2="56149" y2="46176"/>
+                        <a14:foregroundMark x1="56048" y1="45599" x2="56048" y2="45599"/>
+                        <a14:foregroundMark x1="55847" y1="45310" x2="55847" y2="45310"/>
+                        <a14:foregroundMark x1="55847" y1="44589" x2="55847" y2="44589"/>
+                        <a14:foregroundMark x1="55847" y1="44589" x2="55847" y2="44589"/>
+                        <a14:foregroundMark x1="55847" y1="45166" x2="55847" y2="45166"/>
+                        <a14:foregroundMark x1="56048" y1="45599" x2="56048" y2="45599"/>
+                        <a14:foregroundMark x1="56048" y1="45599" x2="56048" y2="45599"/>
+                        <a14:foregroundMark x1="56048" y1="45599" x2="56048" y2="45599"/>
+                        <a14:foregroundMark x1="56048" y1="45599" x2="56048" y2="45599"/>
+                        <a14:foregroundMark x1="56149" y1="45599" x2="56149" y2="45599"/>
+                        <a14:foregroundMark x1="56149" y1="45599" x2="56149" y2="45599"/>
+                        <a14:foregroundMark x1="56149" y1="45310" x2="56149" y2="45310"/>
+                        <a14:foregroundMark x1="56149" y1="45310" x2="56149" y2="45310"/>
+                        <a14:foregroundMark x1="56149" y1="45166" x2="56149" y2="45166"/>
+                        <a14:foregroundMark x1="56149" y1="45166" x2="56149" y2="45166"/>
+                        <a14:foregroundMark x1="56149" y1="45310" x2="56149" y2="45310"/>
+                        <a14:foregroundMark x1="56351" y1="45310" x2="56351" y2="45310"/>
+                        <a14:foregroundMark x1="56552" y1="45310" x2="56552" y2="45310"/>
+                        <a14:foregroundMark x1="56552" y1="45310" x2="56552" y2="45310"/>
+                        <a14:foregroundMark x1="56552" y1="45310" x2="56552" y2="45310"/>
+                        <a14:foregroundMark x1="56552" y1="45310" x2="56552" y2="45310"/>
+                        <a14:foregroundMark x1="56754" y1="45310" x2="56754" y2="45310"/>
+                        <a14:foregroundMark x1="56754" y1="45310" x2="56754" y2="45310"/>
+                        <a14:foregroundMark x1="56754" y1="45310" x2="56754" y2="45310"/>
+                        <a14:foregroundMark x1="56754" y1="45310" x2="56754" y2="45310"/>
+                        <a14:foregroundMark x1="56754" y1="45166" x2="56754" y2="45166"/>
+                        <a14:foregroundMark x1="56754" y1="45166" x2="56754" y2="45166"/>
+                        <a14:foregroundMark x1="56754" y1="44877" x2="56754" y2="44877"/>
+                        <a14:foregroundMark x1="56754" y1="44877" x2="56754" y2="44877"/>
+                        <a14:foregroundMark x1="56754" y1="44877" x2="56754" y2="44877"/>
+                        <a14:foregroundMark x1="56754" y1="44877" x2="56754" y2="44877"/>
+                        <a14:backgroundMark x1="51063" y1="43579" x2="51108" y2="43226"/>
+                        <a14:backgroundMark x1="51008" y1="44012" x2="51063" y2="43579"/>
+                        <a14:backgroundMark x1="58594" y1="45887" x2="58216" y2="45166"/>
+                        <a14:backgroundMark x1="58972" y1="46609" x2="58594" y2="45887"/>
                         <a14:backgroundMark x1="51210" y1="29149" x2="50806" y2="30014"/>
                         <a14:backgroundMark x1="51091" y1="31600" x2="50101" y2="34199"/>
                         <a14:backgroundMark x1="51915" y1="29437" x2="51172" y2="31388"/>
@@ -3460,6 +3574,182 @@
                         <a14:backgroundMark x1="84173" y1="36219" x2="84476" y2="36508"/>
                         <a14:backgroundMark x1="88105" y1="44589" x2="88105" y2="44589"/>
                         <a14:backgroundMark x1="75202" y1="46609" x2="74899" y2="46465"/>
+                        <a14:backgroundMark x1="56754" y1="45166" x2="56754" y2="45166"/>
+                        <a14:backgroundMark x1="56754" y1="44877" x2="56754" y2="44877"/>
+                        <a14:backgroundMark x1="56754" y1="44877" x2="56754" y2="44877"/>
+                        <a14:backgroundMark x1="56552" y1="43723" x2="56552" y2="43723"/>
+                        <a14:backgroundMark x1="56552" y1="43723" x2="56552" y2="43723"/>
+                        <a14:backgroundMark x1="56552" y1="43723" x2="56552" y2="43723"/>
+                        <a14:backgroundMark x1="56552" y1="43579" x2="56552" y2="43579"/>
+                        <a14:backgroundMark x1="56552" y1="43579" x2="56552" y2="43579"/>
+                        <a14:backgroundMark x1="56754" y1="43290" x2="56754" y2="43290"/>
+                        <a14:backgroundMark x1="56754" y1="42713" x2="56754" y2="42713"/>
+                        <a14:backgroundMark x1="56754" y1="41703" x2="56754" y2="41703"/>
+                        <a14:backgroundMark x1="50706" y1="43723" x2="50706" y2="43723"/>
+                        <a14:backgroundMark x1="51512" y1="43001" x2="51512" y2="43001"/>
+                        <a14:backgroundMark x1="51310" y1="42424" x2="51310" y2="42424"/>
+                        <a14:backgroundMark x1="51310" y1="41991" x2="51310" y2="41991"/>
+                        <a14:backgroundMark x1="51512" y1="41126" x2="51512" y2="41126"/>
+                        <a14:backgroundMark x1="49698" y1="48196" x2="49698" y2="48196"/>
+                        <a14:backgroundMark x1="49698" y1="48485" x2="49698" y2="48485"/>
+                        <a14:backgroundMark x1="49698" y1="48773" x2="49698" y2="48773"/>
+                        <a14:backgroundMark x1="49698" y1="48773" x2="49698" y2="48773"/>
+                        <a14:backgroundMark x1="50000" y1="49062" x2="50000" y2="49062"/>
+                        <a14:backgroundMark x1="49798" y1="49062" x2="49798" y2="49062"/>
+                        <a14:backgroundMark x1="49798" y1="48773" x2="49798" y2="48773"/>
+                        <a14:backgroundMark x1="49798" y1="48773" x2="49798" y2="48773"/>
+                        <a14:backgroundMark x1="49798" y1="48773" x2="49798" y2="48773"/>
+                        <a14:backgroundMark x1="49798" y1="48773" x2="49798" y2="48773"/>
+                        <a14:backgroundMark x1="49798" y1="48773" x2="49798" y2="48773"/>
+                        <a14:backgroundMark x1="49798" y1="48773" x2="49798" y2="48773"/>
+                        <a14:backgroundMark x1="49798" y1="48773" x2="49798" y2="48773"/>
+                        <a14:backgroundMark x1="49798" y1="48773" x2="49798" y2="48773"/>
+                        <a14:backgroundMark x1="49798" y1="48773" x2="49798" y2="48773"/>
+                        <a14:backgroundMark x1="49798" y1="48773" x2="49798" y2="48773"/>
+                        <a14:backgroundMark x1="49798" y1="48773" x2="49798" y2="48773"/>
+                        <a14:backgroundMark x1="49798" y1="48773" x2="49798" y2="48773"/>
+                        <a14:backgroundMark x1="50000" y1="48773" x2="50000" y2="48773"/>
+                        <a14:backgroundMark x1="50000" y1="48773" x2="50000" y2="48773"/>
+                        <a14:backgroundMark x1="50000" y1="48773" x2="50000" y2="48773"/>
+                        <a14:backgroundMark x1="50000" y1="48773" x2="50000" y2="48773"/>
+                        <a14:backgroundMark x1="50000" y1="47763" x2="50000" y2="47763"/>
+                        <a14:backgroundMark x1="50000" y1="47763" x2="50000" y2="47763"/>
+                        <a14:backgroundMark x1="50202" y1="47763" x2="50202" y2="47763"/>
+                        <a14:backgroundMark x1="50202" y1="47763" x2="50202" y2="47763"/>
+                        <a14:backgroundMark x1="50202" y1="47763" x2="50202" y2="47763"/>
+                        <a14:backgroundMark x1="50202" y1="47763" x2="50202" y2="47763"/>
+                        <a14:backgroundMark x1="50202" y1="47763" x2="50202" y2="47763"/>
+                        <a14:backgroundMark x1="50202" y1="47763" x2="50202" y2="47763"/>
+                        <a14:backgroundMark x1="50403" y1="47763" x2="50403" y2="47763"/>
+                        <a14:backgroundMark x1="50403" y1="47763" x2="50403" y2="47763"/>
+                        <a14:backgroundMark x1="50403" y1="47763" x2="50403" y2="47763"/>
+                        <a14:backgroundMark x1="50403" y1="47763" x2="50403" y2="47763"/>
+                        <a14:backgroundMark x1="50403" y1="47763" x2="50403" y2="47763"/>
+                        <a14:backgroundMark x1="50403" y1="47763" x2="50403" y2="47763"/>
+                        <a14:backgroundMark x1="50403" y1="47763" x2="50403" y2="47763"/>
+                        <a14:backgroundMark x1="50403" y1="47763" x2="50403" y2="47763"/>
+                        <a14:backgroundMark x1="49798" y1="47908" x2="49798" y2="47908"/>
+                        <a14:backgroundMark x1="50706" y1="47186" x2="50706" y2="47186"/>
+                        <a14:backgroundMark x1="50706" y1="47186" x2="50706" y2="47186"/>
+                        <a14:backgroundMark x1="50706" y1="47186" x2="50706" y2="47186"/>
+                        <a14:backgroundMark x1="50706" y1="47186" x2="50706" y2="47186"/>
+                        <a14:backgroundMark x1="50907" y1="46898" x2="50907" y2="46898"/>
+                        <a14:backgroundMark x1="51109" y1="46609" x2="51109" y2="46609"/>
+                        <a14:backgroundMark x1="51109" y1="46609" x2="51109" y2="46609"/>
+                        <a14:backgroundMark x1="51310" y1="45887" x2="51310" y2="45887"/>
+                        <a14:backgroundMark x1="51310" y1="45599" x2="51310" y2="45599"/>
+                        <a14:backgroundMark x1="51310" y1="45310" x2="51310" y2="45310"/>
+                        <a14:backgroundMark x1="51310" y1="45310" x2="51310" y2="45310"/>
+                        <a14:backgroundMark x1="51310" y1="45310" x2="51310" y2="45310"/>
+                        <a14:backgroundMark x1="51310" y1="45310" x2="51310" y2="45310"/>
+                        <a14:backgroundMark x1="51310" y1="45166" x2="51310" y2="45166"/>
+                        <a14:backgroundMark x1="51310" y1="45166" x2="51310" y2="45166"/>
+                        <a14:backgroundMark x1="51310" y1="45166" x2="51310" y2="45166"/>
+                        <a14:backgroundMark x1="51310" y1="45166" x2="51310" y2="45166"/>
+                        <a14:backgroundMark x1="51310" y1="45166" x2="51310" y2="45166"/>
+                        <a14:backgroundMark x1="51310" y1="44877" x2="51310" y2="44877"/>
+                        <a14:backgroundMark x1="51310" y1="44877" x2="51310" y2="44877"/>
+                        <a14:backgroundMark x1="51512" y1="44589" x2="51512" y2="44589"/>
+                        <a14:backgroundMark x1="51512" y1="44589" x2="51512" y2="44589"/>
+                        <a14:backgroundMark x1="49496" y1="45887" x2="49496" y2="45887"/>
+                        <a14:backgroundMark x1="49698" y1="46176" x2="49698" y2="46176"/>
+                        <a14:backgroundMark x1="49698" y1="46176" x2="49698" y2="46176"/>
+                        <a14:backgroundMark x1="50000" y1="46609" x2="50000" y2="46609"/>
+                        <a14:backgroundMark x1="50202" y1="46609" x2="50202" y2="46609"/>
+                        <a14:backgroundMark x1="50202" y1="46609" x2="50202" y2="46609"/>
+                        <a14:backgroundMark x1="50403" y1="46609" x2="50403" y2="46609"/>
+                        <a14:backgroundMark x1="50605" y1="46609" x2="50605" y2="46609"/>
+                        <a14:backgroundMark x1="50403" y1="47186" x2="50403" y2="47186"/>
+                        <a14:backgroundMark x1="50403" y1="47186" x2="50403" y2="47186"/>
+                        <a14:backgroundMark x1="50403" y1="46609" x2="50403" y2="46609"/>
+                        <a14:backgroundMark x1="50403" y1="46609" x2="50403" y2="46609"/>
+                        <a14:backgroundMark x1="50403" y1="46465" x2="50403" y2="46465"/>
+                        <a14:backgroundMark x1="50403" y1="46465" x2="50403" y2="46465"/>
+                        <a14:backgroundMark x1="50202" y1="46609" x2="50202" y2="46609"/>
+                        <a14:backgroundMark x1="50202" y1="47186" x2="50202" y2="47186"/>
+                        <a14:backgroundMark x1="50202" y1="47186" x2="50202" y2="47186"/>
+                        <a14:backgroundMark x1="50907" y1="46465" x2="50907" y2="46465"/>
+                        <a14:backgroundMark x1="50605" y1="46609" x2="50605" y2="46609"/>
+                        <a14:backgroundMark x1="50605" y1="46609" x2="50605" y2="46609"/>
+                        <a14:backgroundMark x1="50605" y1="46609" x2="50605" y2="46609"/>
+                        <a14:backgroundMark x1="50605" y1="46465" x2="50605" y2="46465"/>
+                        <a14:backgroundMark x1="50605" y1="46176" x2="50605" y2="46176"/>
+                        <a14:backgroundMark x1="50605" y1="45887" x2="50605" y2="45887"/>
+                        <a14:backgroundMark x1="50706" y1="45599" x2="50706" y2="45599"/>
+                        <a14:backgroundMark x1="50706" y1="45599" x2="50706" y2="45599"/>
+                        <a14:backgroundMark x1="50907" y1="45599" x2="50907" y2="45599"/>
+                        <a14:backgroundMark x1="51109" y1="45599" x2="51109" y2="45599"/>
+                        <a14:backgroundMark x1="51109" y1="45599" x2="51109" y2="45599"/>
+                        <a14:backgroundMark x1="50706" y1="46176" x2="50706" y2="46176"/>
+                        <a14:backgroundMark x1="50706" y1="46176" x2="50706" y2="46176"/>
+                        <a14:backgroundMark x1="50706" y1="46176" x2="50706" y2="46176"/>
+                        <a14:backgroundMark x1="50706" y1="46176" x2="50706" y2="46176"/>
+                        <a14:backgroundMark x1="50706" y1="46176" x2="50706" y2="46176"/>
+                        <a14:backgroundMark x1="50706" y1="46465" x2="50706" y2="46465"/>
+                        <a14:backgroundMark x1="50706" y1="46465" x2="50706" y2="46465"/>
+                        <a14:backgroundMark x1="50706" y1="46465" x2="50706" y2="46465"/>
+                        <a14:backgroundMark x1="50907" y1="46465" x2="50907" y2="46465"/>
+                        <a14:backgroundMark x1="51109" y1="46176" x2="51109" y2="46176"/>
+                        <a14:backgroundMark x1="51109" y1="46176" x2="51109" y2="46176"/>
+                        <a14:backgroundMark x1="51109" y1="46176" x2="51109" y2="46176"/>
+                        <a14:backgroundMark x1="51109" y1="46176" x2="51109" y2="46176"/>
+                        <a14:backgroundMark x1="51109" y1="46465" x2="51109" y2="46465"/>
+                        <a14:backgroundMark x1="50706" y1="46609" x2="50706" y2="46609"/>
+                        <a14:backgroundMark x1="50706" y1="46609" x2="50706" y2="46609"/>
+                        <a14:backgroundMark x1="50706" y1="46609" x2="50706" y2="46609"/>
+                        <a14:backgroundMark x1="50605" y1="46898" x2="50605" y2="46898"/>
+                        <a14:backgroundMark x1="50605" y1="46898" x2="50605" y2="46898"/>
+                        <a14:backgroundMark x1="50605" y1="46898" x2="50605" y2="46898"/>
+                        <a14:backgroundMark x1="51109" y1="46176" x2="51109" y2="46176"/>
+                        <a14:backgroundMark x1="51310" y1="46176" x2="51310" y2="46176"/>
+                        <a14:backgroundMark x1="51310" y1="46176" x2="51310" y2="46176"/>
+                        <a14:backgroundMark x1="51310" y1="46176" x2="51310" y2="46176"/>
+                        <a14:backgroundMark x1="51512" y1="46176" x2="51512" y2="46176"/>
+                        <a14:backgroundMark x1="51512" y1="46176" x2="51512" y2="46176"/>
+                        <a14:backgroundMark x1="51512" y1="46176" x2="51512" y2="46176"/>
+                        <a14:backgroundMark x1="51512" y1="45887" x2="50605" y2="46898"/>
+                        <a14:backgroundMark x1="50605" y1="46898" x2="49698" y2="49495"/>
+                        <a14:backgroundMark x1="49798" y1="49784" x2="49798" y2="49784"/>
+                        <a14:backgroundMark x1="49698" y1="50505" x2="49698" y2="50505"/>
+                        <a14:backgroundMark x1="49698" y1="50794" x2="49294" y2="51371"/>
+                        <a14:backgroundMark x1="48790" y1="51659" x2="49093" y2="52092"/>
+                        <a14:backgroundMark x1="48891" y1="51659" x2="49294" y2="51804"/>
+                        <a14:backgroundMark x1="49093" y1="53968" x2="49093" y2="53968"/>
+                        <a14:backgroundMark x1="49093" y1="54257" x2="49093" y2="54257"/>
+                        <a14:backgroundMark x1="49093" y1="54257" x2="49093" y2="54257"/>
+                        <a14:backgroundMark x1="49294" y1="54401" x2="49294" y2="54401"/>
+                        <a14:backgroundMark x1="49496" y1="55556" x2="49496" y2="55556"/>
+                        <a14:backgroundMark x1="49496" y1="55556" x2="49496" y2="55556"/>
+                        <a14:backgroundMark x1="49496" y1="55556" x2="49496" y2="55556"/>
+                        <a14:backgroundMark x1="49496" y1="55556" x2="49496" y2="55556"/>
+                        <a14:backgroundMark x1="49496" y1="54978" x2="49496" y2="54978"/>
+                        <a14:backgroundMark x1="49294" y1="54257" x2="49294" y2="54257"/>
+                        <a14:backgroundMark x1="49294" y1="54257" x2="49294" y2="54257"/>
+                        <a14:backgroundMark x1="49093" y1="53391" x2="49093" y2="53391"/>
+                        <a14:backgroundMark x1="49093" y1="53102" x2="49093" y2="53102"/>
+                        <a14:backgroundMark x1="49093" y1="53102" x2="49093" y2="55556"/>
+                        <a14:backgroundMark x1="49093" y1="53968" x2="49093" y2="53968"/>
+                        <a14:backgroundMark x1="49093" y1="53102" x2="49093" y2="53102"/>
+                        <a14:backgroundMark x1="49093" y1="52670" x2="49093" y2="52670"/>
+                        <a14:backgroundMark x1="49294" y1="52670" x2="49294" y2="52670"/>
+                        <a14:backgroundMark x1="49294" y1="52958" x2="49294" y2="52958"/>
+                        <a14:backgroundMark x1="49294" y1="52958" x2="49294" y2="52958"/>
+                        <a14:backgroundMark x1="49496" y1="52958" x2="49496" y2="52958"/>
+                        <a14:backgroundMark x1="49496" y1="52670" x2="49496" y2="52670"/>
+                        <a14:backgroundMark x1="49496" y1="52670" x2="49496" y2="52670"/>
+                        <a14:backgroundMark x1="49496" y1="52092" x2="49496" y2="52092"/>
+                        <a14:backgroundMark x1="49496" y1="51804" x2="49496" y2="51804"/>
+                        <a14:backgroundMark x1="49496" y1="51804" x2="49496" y2="51804"/>
+                        <a14:backgroundMark x1="49698" y1="52381" x2="49698" y2="52381"/>
+                        <a14:backgroundMark x1="49698" y1="52381" x2="49698" y2="52381"/>
+                        <a14:backgroundMark x1="49698" y1="52381" x2="49698" y2="52381"/>
+                        <a14:backgroundMark x1="49698" y1="52381" x2="49698" y2="52381"/>
+                        <a14:backgroundMark x1="49698" y1="52381" x2="49698" y2="52381"/>
+                        <a14:backgroundMark x1="49698" y1="51659" x2="49698" y2="51659"/>
+                        <a14:backgroundMark x1="49698" y1="51659" x2="49698" y2="51659"/>
+                        <a14:backgroundMark x1="49798" y1="51804" x2="49798" y2="51804"/>
+                        <a14:backgroundMark x1="49798" y1="51804" x2="49798" y2="51804"/>
+                        <a14:backgroundMark x1="49798" y1="51804" x2="49798" y2="51804"/>
                       </a14:backgroundRemoval>
                     </a14:imgEffect>
                   </a14:imgLayer>
@@ -3474,7 +3764,37 @@
         <p:spPr>
           <a:xfrm>
             <a:off x="2827020" y="1058862"/>
-            <a:ext cx="6299200" cy="4394200"/>
+            <a:ext cx="6021070" cy="4200182"/>
+          </a:xfrm>
+          <a:prstGeom prst="rect">
+            <a:avLst/>
+          </a:prstGeom>
+        </p:spPr>
+      </p:pic>
+      <p:pic>
+        <p:nvPicPr>
+          <p:cNvPr id="5" name="Picture 4">
+            <a:extLst>
+              <a:ext uri="{FF2B5EF4-FFF2-40B4-BE49-F238E27FC236}">
+                <a16:creationId xmlns:a16="http://schemas.microsoft.com/office/drawing/2014/main" id="{E7CD487C-05E4-E449-8EC9-6CECE3DFFF3D}"/>
+              </a:ext>
+            </a:extLst>
+          </p:cNvPr>
+          <p:cNvPicPr>
+            <a:picLocks noChangeAspect="1"/>
+          </p:cNvPicPr>
+          <p:nvPr/>
+        </p:nvPicPr>
+        <p:blipFill>
+          <a:blip r:embed="rId4"/>
+          <a:stretch>
+            <a:fillRect/>
+          </a:stretch>
+        </p:blipFill>
+        <p:spPr>
+          <a:xfrm>
+            <a:off x="2827020" y="1058862"/>
+            <a:ext cx="6021070" cy="4188570"/>
           </a:xfrm>
           <a:prstGeom prst="rect">
             <a:avLst/>

</xml_diff>